<commit_message>
Kratak CV, manje izmene na prezentaciji
</commit_message>
<xml_diff>
--- a/prezentacija.pptx
+++ b/prezentacija.pptx
@@ -5554,7 +5554,7 @@
         </p:nvSpPr>
         <p:spPr>
           <a:xfrm>
-            <a:off x="6700892" y="5012370"/>
+            <a:off x="7769838" y="5012368"/>
             <a:ext cx="3600406" cy="988540"/>
           </a:xfrm>
           <a:prstGeom prst="rect">
@@ -5845,7 +5845,7 @@
         </p:nvSpPr>
         <p:spPr>
           <a:xfrm>
-            <a:off x="2848291" y="5082391"/>
+            <a:off x="1705232" y="5082390"/>
             <a:ext cx="2734491" cy="848497"/>
           </a:xfrm>
           <a:prstGeom prst="rect">
@@ -7362,7 +7362,27 @@
                 <a:latin typeface="Arial" panose="020B0604020202020204" pitchFamily="34" charset="0"/>
                 <a:cs typeface="Arial" panose="020B0604020202020204" pitchFamily="34" charset="0"/>
               </a:rPr>
-              <a:t>MVP nema jasnih smernica za implementaciju, moguće je napraviti jako složene interfejse između pogleda i prezentera</a:t>
+              <a:t>MVP nema </a:t>
+            </a:r>
+            <a:r>
+              <a:rPr lang="sr-Latn-RS" sz="2200" smtClean="0">
+                <a:solidFill>
+                  <a:schemeClr val="bg1"/>
+                </a:solidFill>
+                <a:latin typeface="Arial" panose="020B0604020202020204" pitchFamily="34" charset="0"/>
+                <a:cs typeface="Arial" panose="020B0604020202020204" pitchFamily="34" charset="0"/>
+              </a:rPr>
+              <a:t>čvrstih smernica </a:t>
+            </a:r>
+            <a:r>
+              <a:rPr lang="sr-Latn-RS" sz="2200" smtClean="0">
+                <a:solidFill>
+                  <a:schemeClr val="bg1"/>
+                </a:solidFill>
+                <a:latin typeface="Arial" panose="020B0604020202020204" pitchFamily="34" charset="0"/>
+                <a:cs typeface="Arial" panose="020B0604020202020204" pitchFamily="34" charset="0"/>
+              </a:rPr>
+              <a:t>za implementaciju, moguće je napraviti jako složene interfejse između pogleda i prezentera</a:t>
             </a:r>
             <a:endParaRPr lang="sr-Latn-RS" sz="2200">
               <a:solidFill>
@@ -7740,7 +7760,33 @@
                 <a:latin typeface="Arial" panose="020B0604020202020204" pitchFamily="34" charset="0"/>
                 <a:cs typeface="Arial" panose="020B0604020202020204" pitchFamily="34" charset="0"/>
               </a:rPr>
-              <a:t>= b + c</a:t>
+              <a:t>= b + </a:t>
+            </a:r>
+            <a:r>
+              <a:rPr lang="en-US" sz="2200" smtClean="0">
+                <a:solidFill>
+                  <a:schemeClr val="bg1"/>
+                </a:solidFill>
+                <a:latin typeface="Arial" panose="020B0604020202020204" pitchFamily="34" charset="0"/>
+                <a:cs typeface="Arial" panose="020B0604020202020204" pitchFamily="34" charset="0"/>
+              </a:rPr>
+              <a:t>c</a:t>
+            </a:r>
+          </a:p>
+          <a:p>
+            <a:pPr marL="342900" indent="-342900">
+              <a:buFont typeface="Arial" panose="020B0604020202020204" pitchFamily="34" charset="0"/>
+              <a:buChar char="•"/>
+            </a:pPr>
+            <a:r>
+              <a:rPr lang="sr-Latn-RS" sz="2200" smtClean="0">
+                <a:solidFill>
+                  <a:schemeClr val="bg1"/>
+                </a:solidFill>
+                <a:latin typeface="Arial" panose="020B0604020202020204" pitchFamily="34" charset="0"/>
+                <a:cs typeface="Arial" panose="020B0604020202020204" pitchFamily="34" charset="0"/>
+              </a:rPr>
+              <a:t>Reaktivno programiranje nalazi svoju primenu u Androidu kao rešenje za neke česte probleme i alternativa AsyncTaskovima</a:t>
             </a:r>
             <a:endParaRPr lang="sr-Latn-RS" sz="2200" cap="none" smtClean="0">
               <a:solidFill>
@@ -7822,15 +7868,18 @@
                 <a:latin typeface="Arial" panose="020B0604020202020204" pitchFamily="34" charset="0"/>
                 <a:cs typeface="Arial" panose="020B0604020202020204" pitchFamily="34" charset="0"/>
               </a:rPr>
-              <a:t>Puna podrška u okviru Android Studija 3.0</a:t>
-            </a:r>
-            <a:endParaRPr lang="sr-Latn-RS" sz="2200">
-              <a:solidFill>
-                <a:schemeClr val="bg1"/>
-              </a:solidFill>
-              <a:latin typeface="Arial" panose="020B0604020202020204" pitchFamily="34" charset="0"/>
-              <a:cs typeface="Arial" panose="020B0604020202020204" pitchFamily="34" charset="0"/>
-            </a:endParaRPr>
+              <a:t>Puna podrška u okviru Android Studija </a:t>
+            </a:r>
+            <a:r>
+              <a:rPr lang="sr-Latn-RS" sz="2200" smtClean="0">
+                <a:solidFill>
+                  <a:schemeClr val="bg1"/>
+                </a:solidFill>
+                <a:latin typeface="Arial" panose="020B0604020202020204" pitchFamily="34" charset="0"/>
+                <a:cs typeface="Arial" panose="020B0604020202020204" pitchFamily="34" charset="0"/>
+              </a:rPr>
+              <a:t>3.0</a:t>
+            </a:r>
           </a:p>
         </p:txBody>
       </p:sp>
@@ -8097,6 +8146,55 @@
                       </p:childTnLst>
                     </p:cTn>
                   </p:par>
+                  <p:par>
+                    <p:cTn id="23" fill="hold">
+                      <p:stCondLst>
+                        <p:cond delay="indefinite"/>
+                      </p:stCondLst>
+                      <p:childTnLst>
+                        <p:par>
+                          <p:cTn id="24" fill="hold">
+                            <p:stCondLst>
+                              <p:cond delay="0"/>
+                            </p:stCondLst>
+                            <p:childTnLst>
+                              <p:par>
+                                <p:cTn id="25" presetID="1" presetClass="entr" presetSubtype="0" fill="hold" nodeType="clickEffect">
+                                  <p:stCondLst>
+                                    <p:cond delay="0"/>
+                                  </p:stCondLst>
+                                  <p:childTnLst>
+                                    <p:set>
+                                      <p:cBhvr>
+                                        <p:cTn id="26" dur="1" fill="hold">
+                                          <p:stCondLst>
+                                            <p:cond delay="0"/>
+                                          </p:stCondLst>
+                                        </p:cTn>
+                                        <p:tgtEl>
+                                          <p:spTgt spid="5">
+                                            <p:txEl>
+                                              <p:pRg st="5" end="5"/>
+                                            </p:txEl>
+                                          </p:spTgt>
+                                        </p:tgtEl>
+                                        <p:attrNameLst>
+                                          <p:attrName>style.visibility</p:attrName>
+                                        </p:attrNameLst>
+                                      </p:cBhvr>
+                                      <p:to>
+                                        <p:strVal val="visible"/>
+                                      </p:to>
+                                    </p:set>
+                                  </p:childTnLst>
+                                </p:cTn>
+                              </p:par>
+                            </p:childTnLst>
+                          </p:cTn>
+                        </p:par>
+                      </p:childTnLst>
+                    </p:cTn>
+                  </p:par>
                 </p:childTnLst>
               </p:cTn>
               <p:prevCondLst>
@@ -8420,26 +8518,6 @@
               <a:buFont typeface="Arial" panose="020B0604020202020204" pitchFamily="34" charset="0"/>
               <a:buChar char="•"/>
             </a:pPr>
-            <a:r>
-              <a:rPr lang="en-US" sz="2200" smtClean="0">
-                <a:solidFill>
-                  <a:schemeClr val="bg1"/>
-                </a:solidFill>
-                <a:latin typeface="Arial" panose="020B0604020202020204" pitchFamily="34" charset="0"/>
-                <a:cs typeface="Arial" panose="020B0604020202020204" pitchFamily="34" charset="0"/>
-              </a:rPr>
-              <a:t>Alternativa AsyncTaskovima,</a:t>
-            </a:r>
-            <a:r>
-              <a:rPr lang="en-US" sz="2400">
-                <a:solidFill>
-                  <a:schemeClr val="bg1"/>
-                </a:solidFill>
-                <a:latin typeface="Courier New" panose="02070309020205020404" pitchFamily="49" charset="0"/>
-                <a:cs typeface="Courier New" panose="02070309020205020404" pitchFamily="49" charset="0"/>
-              </a:rPr>
-              <a:t> </a:t>
-            </a:r>
             <a:r>
               <a:rPr lang="en-US" sz="2400" smtClean="0">
                 <a:solidFill>
@@ -9207,8 +9285,81 @@
                 <a:latin typeface="Arial" panose="020B0604020202020204" pitchFamily="34" charset="0"/>
                 <a:cs typeface="Arial" panose="020B0604020202020204" pitchFamily="34" charset="0"/>
               </a:rPr>
-              <a:t>prihvata objekte jednog emitera, transformiše svaki objekat u emitera i spaja u jedno emitovanje</a:t>
-            </a:r>
+              <a:t>prihvata objekte jednog emitera, transformiše svaki objekat u emitera i spaja u jedno </a:t>
+            </a:r>
+            <a:r>
+              <a:rPr lang="sr-Latn-RS" sz="2000" smtClean="0">
+                <a:solidFill>
+                  <a:schemeClr val="bg1"/>
+                </a:solidFill>
+                <a:latin typeface="Arial" panose="020B0604020202020204" pitchFamily="34" charset="0"/>
+                <a:cs typeface="Arial" panose="020B0604020202020204" pitchFamily="34" charset="0"/>
+              </a:rPr>
+              <a:t>emitovanje</a:t>
+            </a:r>
+          </a:p>
+          <a:p>
+            <a:pPr marL="342900" indent="-342900">
+              <a:buFont typeface="Arial" panose="020B0604020202020204" pitchFamily="34" charset="0"/>
+              <a:buChar char="•"/>
+            </a:pPr>
+            <a:r>
+              <a:rPr lang="sr-Latn-RS" sz="2000" smtClean="0">
+                <a:solidFill>
+                  <a:schemeClr val="bg1"/>
+                </a:solidFill>
+                <a:latin typeface="Courier New" panose="02070309020205020404" pitchFamily="49" charset="0"/>
+                <a:cs typeface="Courier New" panose="02070309020205020404" pitchFamily="49" charset="0"/>
+              </a:rPr>
+              <a:t>doOnNext</a:t>
+            </a:r>
+            <a:r>
+              <a:rPr lang="sr-Latn-RS" sz="2000" b="1" smtClean="0">
+                <a:solidFill>
+                  <a:schemeClr val="bg1"/>
+                </a:solidFill>
+                <a:latin typeface="Courier New" panose="02070309020205020404" pitchFamily="49" charset="0"/>
+                <a:cs typeface="Courier New" panose="02070309020205020404" pitchFamily="49" charset="0"/>
+              </a:rPr>
+              <a:t> </a:t>
+            </a:r>
+            <a:r>
+              <a:rPr lang="sr-Latn-RS" sz="2000">
+                <a:solidFill>
+                  <a:schemeClr val="bg1"/>
+                </a:solidFill>
+                <a:latin typeface="Arial" panose="020B0604020202020204" pitchFamily="34" charset="0"/>
+                <a:cs typeface="Arial" panose="020B0604020202020204" pitchFamily="34" charset="0"/>
+              </a:rPr>
+              <a:t>–</a:t>
+            </a:r>
+            <a:r>
+              <a:rPr lang="sr-Latn-RS" sz="2000" b="1">
+                <a:solidFill>
+                  <a:schemeClr val="bg1"/>
+                </a:solidFill>
+                <a:latin typeface="Courier New" panose="02070309020205020404" pitchFamily="49" charset="0"/>
+                <a:cs typeface="Courier New" panose="02070309020205020404" pitchFamily="49" charset="0"/>
+              </a:rPr>
+              <a:t> </a:t>
+            </a:r>
+            <a:r>
+              <a:rPr lang="sr-Latn-RS" sz="2000" smtClean="0">
+                <a:solidFill>
+                  <a:schemeClr val="bg1"/>
+                </a:solidFill>
+                <a:latin typeface="Arial" panose="020B0604020202020204" pitchFamily="34" charset="0"/>
+                <a:cs typeface="Arial" panose="020B0604020202020204" pitchFamily="34" charset="0"/>
+              </a:rPr>
+              <a:t>izvršavanje neke akcije pri svakom emitovanju</a:t>
+            </a:r>
+            <a:endParaRPr lang="sr-Latn-RS" sz="2000" smtClean="0">
+              <a:solidFill>
+                <a:schemeClr val="bg1"/>
+              </a:solidFill>
+              <a:latin typeface="Arial" panose="020B0604020202020204" pitchFamily="34" charset="0"/>
+              <a:cs typeface="Arial" panose="020B0604020202020204" pitchFamily="34" charset="0"/>
+            </a:endParaRPr>
           </a:p>
           <a:p>
             <a:pPr marL="342900" indent="-342900">
@@ -9676,6 +9827,55 @@
                                           <p:spTgt spid="5">
                                             <p:txEl>
                                               <p:pRg st="5" end="5"/>
+                                            </p:txEl>
+                                          </p:spTgt>
+                                        </p:tgtEl>
+                                        <p:attrNameLst>
+                                          <p:attrName>style.visibility</p:attrName>
+                                        </p:attrNameLst>
+                                      </p:cBhvr>
+                                      <p:to>
+                                        <p:strVal val="visible"/>
+                                      </p:to>
+                                    </p:set>
+                                  </p:childTnLst>
+                                </p:cTn>
+                              </p:par>
+                            </p:childTnLst>
+                          </p:cTn>
+                        </p:par>
+                      </p:childTnLst>
+                    </p:cTn>
+                  </p:par>
+                  <p:par>
+                    <p:cTn id="27" fill="hold">
+                      <p:stCondLst>
+                        <p:cond delay="indefinite"/>
+                      </p:stCondLst>
+                      <p:childTnLst>
+                        <p:par>
+                          <p:cTn id="28" fill="hold">
+                            <p:stCondLst>
+                              <p:cond delay="0"/>
+                            </p:stCondLst>
+                            <p:childTnLst>
+                              <p:par>
+                                <p:cTn id="29" presetID="1" presetClass="entr" presetSubtype="0" fill="hold" nodeType="clickEffect">
+                                  <p:stCondLst>
+                                    <p:cond delay="0"/>
+                                  </p:stCondLst>
+                                  <p:childTnLst>
+                                    <p:set>
+                                      <p:cBhvr>
+                                        <p:cTn id="30" dur="1" fill="hold">
+                                          <p:stCondLst>
+                                            <p:cond delay="0"/>
+                                          </p:stCondLst>
+                                        </p:cTn>
+                                        <p:tgtEl>
+                                          <p:spTgt spid="5">
+                                            <p:txEl>
+                                              <p:pRg st="6" end="6"/>
                                             </p:txEl>
                                           </p:spTgt>
                                         </p:tgtEl>
@@ -12602,8 +12802,15 @@
                 <a:latin typeface="Arial" panose="020B0604020202020204" pitchFamily="34" charset="0"/>
                 <a:cs typeface="Arial" panose="020B0604020202020204" pitchFamily="34" charset="0"/>
               </a:rPr>
-              <a:t>Graf zavisnosti može biti jako složen</a:t>
-            </a:r>
+              <a:t>Implementacija i graf zavisnosti mogu biti jako složeni</a:t>
+            </a:r>
+            <a:endParaRPr lang="sr-Latn-RS" sz="2000" smtClean="0">
+              <a:solidFill>
+                <a:schemeClr val="bg1"/>
+              </a:solidFill>
+              <a:latin typeface="Arial" panose="020B0604020202020204" pitchFamily="34" charset="0"/>
+              <a:cs typeface="Arial" panose="020B0604020202020204" pitchFamily="34" charset="0"/>
+            </a:endParaRPr>
           </a:p>
           <a:p>
             <a:endParaRPr lang="sr-Latn-RS" sz="2000" smtClean="0">
@@ -13522,13 +13729,6 @@
               </a:rPr>
               <a:t>Kotlin</a:t>
             </a:r>
-            <a:endParaRPr lang="sr-Latn-RS" sz="2000" smtClean="0">
-              <a:solidFill>
-                <a:schemeClr val="bg1"/>
-              </a:solidFill>
-              <a:latin typeface="Arial" panose="020B0604020202020204" pitchFamily="34" charset="0"/>
-              <a:cs typeface="Arial" panose="020B0604020202020204" pitchFamily="34" charset="0"/>
-            </a:endParaRPr>
           </a:p>
           <a:p>
             <a:pPr marL="342900" indent="-342900">
@@ -14717,45 +14917,8 @@
                 <a:latin typeface="Arial" panose="020B0604020202020204" pitchFamily="34" charset="0"/>
                 <a:cs typeface="Arial" panose="020B0604020202020204" pitchFamily="34" charset="0"/>
               </a:rPr>
-              <a:t>ći programski okvir </a:t>
-            </a:r>
-            <a:r>
-              <a:rPr lang="sr-Latn-RS" sz="2200" cap="none" smtClean="0">
-                <a:solidFill>
-                  <a:schemeClr val="bg1"/>
-                </a:solidFill>
-                <a:latin typeface="Arial" panose="020B0604020202020204" pitchFamily="34" charset="0"/>
-                <a:cs typeface="Arial" panose="020B0604020202020204" pitchFamily="34" charset="0"/>
-              </a:rPr>
-              <a:t>Express </a:t>
-            </a:r>
-            <a:r>
-              <a:rPr lang="sr-Latn-RS" sz="2200" cap="none" smtClean="0">
-                <a:solidFill>
-                  <a:schemeClr val="bg1"/>
-                </a:solidFill>
-                <a:latin typeface="Arial" panose="020B0604020202020204" pitchFamily="34" charset="0"/>
-                <a:cs typeface="Arial" panose="020B0604020202020204" pitchFamily="34" charset="0"/>
-              </a:rPr>
-              <a:t>koji se izvršava na izvršnom okruženju </a:t>
-            </a:r>
-            <a:r>
-              <a:rPr lang="sr-Latn-RS" sz="2200" cap="none" smtClean="0">
-                <a:solidFill>
-                  <a:schemeClr val="bg1"/>
-                </a:solidFill>
-                <a:latin typeface="Arial" panose="020B0604020202020204" pitchFamily="34" charset="0"/>
-                <a:cs typeface="Arial" panose="020B0604020202020204" pitchFamily="34" charset="0"/>
-              </a:rPr>
-              <a:t>NodeJS</a:t>
-            </a:r>
-            <a:endParaRPr lang="sr-Latn-RS" sz="2200" cap="none" smtClean="0">
-              <a:solidFill>
-                <a:schemeClr val="bg1"/>
-              </a:solidFill>
-              <a:latin typeface="Arial" panose="020B0604020202020204" pitchFamily="34" charset="0"/>
-              <a:cs typeface="Arial" panose="020B0604020202020204" pitchFamily="34" charset="0"/>
-            </a:endParaRPr>
+              <a:t>ći programski okvir Express koji se izvršava na izvršnom okruženju NodeJS</a:t>
+            </a:r>
           </a:p>
           <a:p>
             <a:pPr marL="342900" indent="-342900">

</xml_diff>